<commit_message>
Updated text before coauthors review
</commit_message>
<xml_diff>
--- a/text/figures/ZoI_conceptual.pptx
+++ b/text/figures/ZoI_conceptual.pptx
@@ -6,6 +6,9 @@
   </p:sldMasterIdLst>
   <p:sldIdLst>
     <p:sldId id="256" r:id="rId2"/>
+    <p:sldId id="257" r:id="rId3"/>
+    <p:sldId id="258" r:id="rId4"/>
+    <p:sldId id="259" r:id="rId5"/>
   </p:sldIdLst>
   <p:sldSz cx="7254875" cy="9144000"/>
   <p:notesSz cx="6858000" cy="9144000"/>
@@ -243,7 +246,7 @@
           <a:p>
             <a:fld id="{FA96F307-F126-4BCC-B0FF-7BECA08F84BB}" type="datetimeFigureOut">
               <a:rPr lang="nb-NO" smtClean="0"/>
-              <a:t>13.01.2022</a:t>
+              <a:t>15.02.2022</a:t>
             </a:fld>
             <a:endParaRPr lang="nb-NO"/>
           </a:p>
@@ -413,7 +416,7 @@
           <a:p>
             <a:fld id="{FA96F307-F126-4BCC-B0FF-7BECA08F84BB}" type="datetimeFigureOut">
               <a:rPr lang="nb-NO" smtClean="0"/>
-              <a:t>13.01.2022</a:t>
+              <a:t>15.02.2022</a:t>
             </a:fld>
             <a:endParaRPr lang="nb-NO"/>
           </a:p>
@@ -593,7 +596,7 @@
           <a:p>
             <a:fld id="{FA96F307-F126-4BCC-B0FF-7BECA08F84BB}" type="datetimeFigureOut">
               <a:rPr lang="nb-NO" smtClean="0"/>
-              <a:t>13.01.2022</a:t>
+              <a:t>15.02.2022</a:t>
             </a:fld>
             <a:endParaRPr lang="nb-NO"/>
           </a:p>
@@ -763,7 +766,7 @@
           <a:p>
             <a:fld id="{FA96F307-F126-4BCC-B0FF-7BECA08F84BB}" type="datetimeFigureOut">
               <a:rPr lang="nb-NO" smtClean="0"/>
-              <a:t>13.01.2022</a:t>
+              <a:t>15.02.2022</a:t>
             </a:fld>
             <a:endParaRPr lang="nb-NO"/>
           </a:p>
@@ -1007,7 +1010,7 @@
           <a:p>
             <a:fld id="{FA96F307-F126-4BCC-B0FF-7BECA08F84BB}" type="datetimeFigureOut">
               <a:rPr lang="nb-NO" smtClean="0"/>
-              <a:t>13.01.2022</a:t>
+              <a:t>15.02.2022</a:t>
             </a:fld>
             <a:endParaRPr lang="nb-NO"/>
           </a:p>
@@ -1239,7 +1242,7 @@
           <a:p>
             <a:fld id="{FA96F307-F126-4BCC-B0FF-7BECA08F84BB}" type="datetimeFigureOut">
               <a:rPr lang="nb-NO" smtClean="0"/>
-              <a:t>13.01.2022</a:t>
+              <a:t>15.02.2022</a:t>
             </a:fld>
             <a:endParaRPr lang="nb-NO"/>
           </a:p>
@@ -1606,7 +1609,7 @@
           <a:p>
             <a:fld id="{FA96F307-F126-4BCC-B0FF-7BECA08F84BB}" type="datetimeFigureOut">
               <a:rPr lang="nb-NO" smtClean="0"/>
-              <a:t>13.01.2022</a:t>
+              <a:t>15.02.2022</a:t>
             </a:fld>
             <a:endParaRPr lang="nb-NO"/>
           </a:p>
@@ -1724,7 +1727,7 @@
           <a:p>
             <a:fld id="{FA96F307-F126-4BCC-B0FF-7BECA08F84BB}" type="datetimeFigureOut">
               <a:rPr lang="nb-NO" smtClean="0"/>
-              <a:t>13.01.2022</a:t>
+              <a:t>15.02.2022</a:t>
             </a:fld>
             <a:endParaRPr lang="nb-NO"/>
           </a:p>
@@ -1819,7 +1822,7 @@
           <a:p>
             <a:fld id="{FA96F307-F126-4BCC-B0FF-7BECA08F84BB}" type="datetimeFigureOut">
               <a:rPr lang="nb-NO" smtClean="0"/>
-              <a:t>13.01.2022</a:t>
+              <a:t>15.02.2022</a:t>
             </a:fld>
             <a:endParaRPr lang="nb-NO"/>
           </a:p>
@@ -2096,7 +2099,7 @@
           <a:p>
             <a:fld id="{FA96F307-F126-4BCC-B0FF-7BECA08F84BB}" type="datetimeFigureOut">
               <a:rPr lang="nb-NO" smtClean="0"/>
-              <a:t>13.01.2022</a:t>
+              <a:t>15.02.2022</a:t>
             </a:fld>
             <a:endParaRPr lang="nb-NO"/>
           </a:p>
@@ -2353,7 +2356,7 @@
           <a:p>
             <a:fld id="{FA96F307-F126-4BCC-B0FF-7BECA08F84BB}" type="datetimeFigureOut">
               <a:rPr lang="nb-NO" smtClean="0"/>
-              <a:t>13.01.2022</a:t>
+              <a:t>15.02.2022</a:t>
             </a:fld>
             <a:endParaRPr lang="nb-NO"/>
           </a:p>
@@ -2566,7 +2569,7 @@
           <a:p>
             <a:fld id="{FA96F307-F126-4BCC-B0FF-7BECA08F84BB}" type="datetimeFigureOut">
               <a:rPr lang="nb-NO" smtClean="0"/>
-              <a:t>13.01.2022</a:t>
+              <a:t>15.02.2022</a:t>
             </a:fld>
             <a:endParaRPr lang="nb-NO"/>
           </a:p>
@@ -3128,6 +3131,1327 @@
 </p:sld>
 </file>
 
+<file path=ppt/slides/slide2.xml><?xml version="1.0" encoding="utf-8"?>
+<p:sld xmlns:a="http://schemas.openxmlformats.org/drawingml/2006/main" xmlns:r="http://schemas.openxmlformats.org/officeDocument/2006/relationships" xmlns:p="http://schemas.openxmlformats.org/presentationml/2006/main">
+  <p:cSld>
+    <p:spTree>
+      <p:nvGrpSpPr>
+        <p:cNvPr id="1" name=""/>
+        <p:cNvGrpSpPr/>
+        <p:nvPr/>
+      </p:nvGrpSpPr>
+      <p:grpSpPr>
+        <a:xfrm>
+          <a:off x="0" y="0"/>
+          <a:ext cx="0" cy="0"/>
+          <a:chOff x="0" y="0"/>
+          <a:chExt cx="0" cy="0"/>
+        </a:xfrm>
+      </p:grpSpPr>
+      <p:pic>
+        <p:nvPicPr>
+          <p:cNvPr id="5" name="Picture 4" descr="A picture containing chart&#10;&#10;Description automatically generated">
+            <a:extLst>
+              <a:ext uri="{FF2B5EF4-FFF2-40B4-BE49-F238E27FC236}">
+                <a16:creationId xmlns:a16="http://schemas.microsoft.com/office/drawing/2014/main" id="{F77AB014-14E3-49F2-BC11-301AD9DF7D05}"/>
+              </a:ext>
+            </a:extLst>
+          </p:cNvPr>
+          <p:cNvPicPr>
+            <a:picLocks noChangeAspect="1"/>
+          </p:cNvPicPr>
+          <p:nvPr/>
+        </p:nvPicPr>
+        <p:blipFill>
+          <a:blip r:embed="rId2">
+            <a:extLst>
+              <a:ext uri="{28A0092B-C50C-407E-A947-70E740481C1C}">
+                <a14:useLocalDpi xmlns:a14="http://schemas.microsoft.com/office/drawing/2010/main" val="0"/>
+              </a:ext>
+            </a:extLst>
+          </a:blip>
+          <a:stretch>
+            <a:fillRect/>
+          </a:stretch>
+        </p:blipFill>
+        <p:spPr>
+          <a:xfrm>
+            <a:off x="381614" y="0"/>
+            <a:ext cx="6735467" cy="4491579"/>
+          </a:xfrm>
+          <a:prstGeom prst="rect">
+            <a:avLst/>
+          </a:prstGeom>
+        </p:spPr>
+      </p:pic>
+      <p:pic>
+        <p:nvPicPr>
+          <p:cNvPr id="7" name="Picture 6" descr="Chart&#10;&#10;Description automatically generated">
+            <a:extLst>
+              <a:ext uri="{FF2B5EF4-FFF2-40B4-BE49-F238E27FC236}">
+                <a16:creationId xmlns:a16="http://schemas.microsoft.com/office/drawing/2014/main" id="{FF180FBF-6EB3-4523-B7A6-91C433CC6AD2}"/>
+              </a:ext>
+            </a:extLst>
+          </p:cNvPr>
+          <p:cNvPicPr>
+            <a:picLocks noChangeAspect="1"/>
+          </p:cNvPicPr>
+          <p:nvPr/>
+        </p:nvPicPr>
+        <p:blipFill>
+          <a:blip r:embed="rId3">
+            <a:extLst>
+              <a:ext uri="{28A0092B-C50C-407E-A947-70E740481C1C}">
+                <a14:useLocalDpi xmlns:a14="http://schemas.microsoft.com/office/drawing/2010/main" val="0"/>
+              </a:ext>
+            </a:extLst>
+          </a:blip>
+          <a:stretch>
+            <a:fillRect/>
+          </a:stretch>
+        </p:blipFill>
+        <p:spPr>
+          <a:xfrm>
+            <a:off x="249841" y="4491579"/>
+            <a:ext cx="6867239" cy="4579452"/>
+          </a:xfrm>
+          <a:prstGeom prst="rect">
+            <a:avLst/>
+          </a:prstGeom>
+        </p:spPr>
+      </p:pic>
+      <p:sp>
+        <p:nvSpPr>
+          <p:cNvPr id="8" name="TextBox 7">
+            <a:extLst>
+              <a:ext uri="{FF2B5EF4-FFF2-40B4-BE49-F238E27FC236}">
+                <a16:creationId xmlns:a16="http://schemas.microsoft.com/office/drawing/2014/main" id="{0DF8DBBB-018A-4423-AC10-6138A38FA0F4}"/>
+              </a:ext>
+            </a:extLst>
+          </p:cNvPr>
+          <p:cNvSpPr txBox="1"/>
+          <p:nvPr/>
+        </p:nvSpPr>
+        <p:spPr>
+          <a:xfrm>
+            <a:off x="249841" y="72969"/>
+            <a:ext cx="402674" cy="523220"/>
+          </a:xfrm>
+          <a:prstGeom prst="rect">
+            <a:avLst/>
+          </a:prstGeom>
+          <a:noFill/>
+        </p:spPr>
+        <p:txBody>
+          <a:bodyPr wrap="none" rtlCol="0">
+            <a:spAutoFit/>
+          </a:bodyPr>
+          <a:lstStyle/>
+          <a:p>
+            <a:r>
+              <a:rPr lang="en-US" sz="2800" dirty="0"/>
+              <a:t>A</a:t>
+            </a:r>
+            <a:endParaRPr lang="nb-NO" sz="2800" dirty="0"/>
+          </a:p>
+        </p:txBody>
+      </p:sp>
+      <p:sp>
+        <p:nvSpPr>
+          <p:cNvPr id="9" name="TextBox 8">
+            <a:extLst>
+              <a:ext uri="{FF2B5EF4-FFF2-40B4-BE49-F238E27FC236}">
+                <a16:creationId xmlns:a16="http://schemas.microsoft.com/office/drawing/2014/main" id="{7E699A75-76EE-4591-BFB6-D837892B1856}"/>
+              </a:ext>
+            </a:extLst>
+          </p:cNvPr>
+          <p:cNvSpPr txBox="1"/>
+          <p:nvPr/>
+        </p:nvSpPr>
+        <p:spPr>
+          <a:xfrm>
+            <a:off x="249840" y="4390812"/>
+            <a:ext cx="386644" cy="523220"/>
+          </a:xfrm>
+          <a:prstGeom prst="rect">
+            <a:avLst/>
+          </a:prstGeom>
+          <a:noFill/>
+        </p:spPr>
+        <p:txBody>
+          <a:bodyPr wrap="none" rtlCol="0">
+            <a:spAutoFit/>
+          </a:bodyPr>
+          <a:lstStyle/>
+          <a:p>
+            <a:r>
+              <a:rPr lang="en-US" sz="2800" dirty="0"/>
+              <a:t>B</a:t>
+            </a:r>
+            <a:endParaRPr lang="nb-NO" sz="2800" dirty="0"/>
+          </a:p>
+        </p:txBody>
+      </p:sp>
+      <p:sp>
+        <p:nvSpPr>
+          <p:cNvPr id="2" name="TextBox 1">
+            <a:extLst>
+              <a:ext uri="{FF2B5EF4-FFF2-40B4-BE49-F238E27FC236}">
+                <a16:creationId xmlns:a16="http://schemas.microsoft.com/office/drawing/2014/main" id="{24777478-F0A9-4DE7-B478-8A34A8100024}"/>
+              </a:ext>
+            </a:extLst>
+          </p:cNvPr>
+          <p:cNvSpPr txBox="1"/>
+          <p:nvPr/>
+        </p:nvSpPr>
+        <p:spPr>
+          <a:xfrm>
+            <a:off x="5933049" y="1382624"/>
+            <a:ext cx="1184031" cy="553998"/>
+          </a:xfrm>
+          <a:prstGeom prst="rect">
+            <a:avLst/>
+          </a:prstGeom>
+          <a:solidFill>
+            <a:schemeClr val="bg1"/>
+          </a:solidFill>
+        </p:spPr>
+        <p:txBody>
+          <a:bodyPr wrap="square" rtlCol="0">
+            <a:spAutoFit/>
+          </a:bodyPr>
+          <a:lstStyle/>
+          <a:p>
+            <a:r>
+              <a:rPr lang="en-US" sz="1500" dirty="0">
+                <a:latin typeface="Helvetica" panose="020B0604020202020204" pitchFamily="34" charset="0"/>
+                <a:cs typeface="Helvetica" panose="020B0604020202020204" pitchFamily="34" charset="0"/>
+              </a:rPr>
+              <a:t>Influence function</a:t>
+            </a:r>
+            <a:endParaRPr lang="nb-NO" sz="1500" dirty="0">
+              <a:latin typeface="Helvetica" panose="020B0604020202020204" pitchFamily="34" charset="0"/>
+              <a:cs typeface="Helvetica" panose="020B0604020202020204" pitchFamily="34" charset="0"/>
+            </a:endParaRPr>
+          </a:p>
+        </p:txBody>
+      </p:sp>
+      <p:cxnSp>
+        <p:nvCxnSpPr>
+          <p:cNvPr id="4" name="Straight Arrow Connector 3">
+            <a:extLst>
+              <a:ext uri="{FF2B5EF4-FFF2-40B4-BE49-F238E27FC236}">
+                <a16:creationId xmlns:a16="http://schemas.microsoft.com/office/drawing/2014/main" id="{4498FA76-9CAD-454A-BCE4-CFFE06CBC816}"/>
+              </a:ext>
+            </a:extLst>
+          </p:cNvPr>
+          <p:cNvCxnSpPr/>
+          <p:nvPr/>
+        </p:nvCxnSpPr>
+        <p:spPr>
+          <a:xfrm>
+            <a:off x="1195754" y="3522582"/>
+            <a:ext cx="2649415" cy="0"/>
+          </a:xfrm>
+          <a:prstGeom prst="straightConnector1">
+            <a:avLst/>
+          </a:prstGeom>
+          <a:ln w="19050">
+            <a:solidFill>
+              <a:schemeClr val="bg1">
+                <a:lumMod val="65000"/>
+              </a:schemeClr>
+            </a:solidFill>
+            <a:headEnd type="triangle" w="lg" len="med"/>
+            <a:tailEnd type="triangle" w="lg" len="med"/>
+          </a:ln>
+        </p:spPr>
+        <p:style>
+          <a:lnRef idx="1">
+            <a:schemeClr val="dk1"/>
+          </a:lnRef>
+          <a:fillRef idx="0">
+            <a:schemeClr val="dk1"/>
+          </a:fillRef>
+          <a:effectRef idx="0">
+            <a:schemeClr val="dk1"/>
+          </a:effectRef>
+          <a:fontRef idx="minor">
+            <a:schemeClr val="tx1"/>
+          </a:fontRef>
+        </p:style>
+      </p:cxnSp>
+      <p:sp>
+        <p:nvSpPr>
+          <p:cNvPr id="6" name="TextBox 5">
+            <a:extLst>
+              <a:ext uri="{FF2B5EF4-FFF2-40B4-BE49-F238E27FC236}">
+                <a16:creationId xmlns:a16="http://schemas.microsoft.com/office/drawing/2014/main" id="{65F86584-546B-4685-AD79-558F0D8592E5}"/>
+              </a:ext>
+            </a:extLst>
+          </p:cNvPr>
+          <p:cNvSpPr txBox="1"/>
+          <p:nvPr/>
+        </p:nvSpPr>
+        <p:spPr>
+          <a:xfrm>
+            <a:off x="6307902" y="1888778"/>
+            <a:ext cx="928459" cy="292388"/>
+          </a:xfrm>
+          <a:prstGeom prst="rect">
+            <a:avLst/>
+          </a:prstGeom>
+          <a:solidFill>
+            <a:schemeClr val="bg1"/>
+          </a:solidFill>
+        </p:spPr>
+        <p:txBody>
+          <a:bodyPr wrap="none" rtlCol="0">
+            <a:spAutoFit/>
+          </a:bodyPr>
+          <a:lstStyle/>
+          <a:p>
+            <a:r>
+              <a:rPr lang="en-US" sz="1300" dirty="0">
+                <a:latin typeface="Helvetica" panose="020B0604020202020204" pitchFamily="34" charset="0"/>
+                <a:cs typeface="Helvetica" panose="020B0604020202020204" pitchFamily="34" charset="0"/>
+              </a:rPr>
+              <a:t>Threshold</a:t>
+            </a:r>
+            <a:endParaRPr lang="nb-NO" sz="1300" dirty="0">
+              <a:latin typeface="Helvetica" panose="020B0604020202020204" pitchFamily="34" charset="0"/>
+              <a:cs typeface="Helvetica" panose="020B0604020202020204" pitchFamily="34" charset="0"/>
+            </a:endParaRPr>
+          </a:p>
+        </p:txBody>
+      </p:sp>
+      <p:sp>
+        <p:nvSpPr>
+          <p:cNvPr id="10" name="TextBox 9">
+            <a:extLst>
+              <a:ext uri="{FF2B5EF4-FFF2-40B4-BE49-F238E27FC236}">
+                <a16:creationId xmlns:a16="http://schemas.microsoft.com/office/drawing/2014/main" id="{E6BB5004-7A11-4436-AD04-5AB8A5DD03A0}"/>
+              </a:ext>
+            </a:extLst>
+          </p:cNvPr>
+          <p:cNvSpPr txBox="1"/>
+          <p:nvPr/>
+        </p:nvSpPr>
+        <p:spPr>
+          <a:xfrm>
+            <a:off x="6342784" y="2144121"/>
+            <a:ext cx="649537" cy="292388"/>
+          </a:xfrm>
+          <a:prstGeom prst="rect">
+            <a:avLst/>
+          </a:prstGeom>
+          <a:solidFill>
+            <a:schemeClr val="bg1"/>
+          </a:solidFill>
+        </p:spPr>
+        <p:txBody>
+          <a:bodyPr wrap="none" rtlCol="0">
+            <a:spAutoFit/>
+          </a:bodyPr>
+          <a:lstStyle/>
+          <a:p>
+            <a:r>
+              <a:rPr lang="en-US" sz="1300" dirty="0">
+                <a:latin typeface="Helvetica" panose="020B0604020202020204" pitchFamily="34" charset="0"/>
+                <a:cs typeface="Helvetica" panose="020B0604020202020204" pitchFamily="34" charset="0"/>
+              </a:rPr>
+              <a:t>Linear</a:t>
+            </a:r>
+            <a:endParaRPr lang="nb-NO" sz="1300" dirty="0">
+              <a:latin typeface="Helvetica" panose="020B0604020202020204" pitchFamily="34" charset="0"/>
+              <a:cs typeface="Helvetica" panose="020B0604020202020204" pitchFamily="34" charset="0"/>
+            </a:endParaRPr>
+          </a:p>
+        </p:txBody>
+      </p:sp>
+      <p:sp>
+        <p:nvSpPr>
+          <p:cNvPr id="11" name="TextBox 10">
+            <a:extLst>
+              <a:ext uri="{FF2B5EF4-FFF2-40B4-BE49-F238E27FC236}">
+                <a16:creationId xmlns:a16="http://schemas.microsoft.com/office/drawing/2014/main" id="{221EEBE5-AF7A-4939-9867-CC91B28E138D}"/>
+              </a:ext>
+            </a:extLst>
+          </p:cNvPr>
+          <p:cNvSpPr txBox="1"/>
+          <p:nvPr/>
+        </p:nvSpPr>
+        <p:spPr>
+          <a:xfrm>
+            <a:off x="6342784" y="2408095"/>
+            <a:ext cx="889987" cy="292388"/>
+          </a:xfrm>
+          <a:prstGeom prst="rect">
+            <a:avLst/>
+          </a:prstGeom>
+          <a:solidFill>
+            <a:schemeClr val="bg1"/>
+          </a:solidFill>
+        </p:spPr>
+        <p:txBody>
+          <a:bodyPr wrap="none" rtlCol="0">
+            <a:spAutoFit/>
+          </a:bodyPr>
+          <a:lstStyle/>
+          <a:p>
+            <a:r>
+              <a:rPr lang="en-US" sz="1300" dirty="0">
+                <a:latin typeface="Helvetica" panose="020B0604020202020204" pitchFamily="34" charset="0"/>
+                <a:cs typeface="Helvetica" panose="020B0604020202020204" pitchFamily="34" charset="0"/>
+              </a:rPr>
+              <a:t>Gaussian</a:t>
+            </a:r>
+            <a:endParaRPr lang="nb-NO" sz="1300" dirty="0">
+              <a:latin typeface="Helvetica" panose="020B0604020202020204" pitchFamily="34" charset="0"/>
+              <a:cs typeface="Helvetica" panose="020B0604020202020204" pitchFamily="34" charset="0"/>
+            </a:endParaRPr>
+          </a:p>
+        </p:txBody>
+      </p:sp>
+      <p:sp>
+        <p:nvSpPr>
+          <p:cNvPr id="14" name="TextBox 13">
+            <a:extLst>
+              <a:ext uri="{FF2B5EF4-FFF2-40B4-BE49-F238E27FC236}">
+                <a16:creationId xmlns:a16="http://schemas.microsoft.com/office/drawing/2014/main" id="{ACCCB353-6138-4916-8A9A-0D5F393B861A}"/>
+              </a:ext>
+            </a:extLst>
+          </p:cNvPr>
+          <p:cNvSpPr txBox="1"/>
+          <p:nvPr/>
+        </p:nvSpPr>
+        <p:spPr>
+          <a:xfrm>
+            <a:off x="1666896" y="3220335"/>
+            <a:ext cx="1566454" cy="307777"/>
+          </a:xfrm>
+          <a:prstGeom prst="rect">
+            <a:avLst/>
+          </a:prstGeom>
+          <a:noFill/>
+        </p:spPr>
+        <p:txBody>
+          <a:bodyPr wrap="none" rtlCol="0">
+            <a:spAutoFit/>
+          </a:bodyPr>
+          <a:lstStyle/>
+          <a:p>
+            <a:r>
+              <a:rPr lang="en-US" sz="1400" dirty="0">
+                <a:latin typeface="Helvetica" panose="020B0604020202020204" pitchFamily="34" charset="0"/>
+                <a:cs typeface="Helvetica" panose="020B0604020202020204" pitchFamily="34" charset="0"/>
+              </a:rPr>
+              <a:t>Zone of Influence</a:t>
+            </a:r>
+            <a:endParaRPr lang="nb-NO" sz="1400" dirty="0">
+              <a:latin typeface="Helvetica" panose="020B0604020202020204" pitchFamily="34" charset="0"/>
+              <a:cs typeface="Helvetica" panose="020B0604020202020204" pitchFamily="34" charset="0"/>
+            </a:endParaRPr>
+          </a:p>
+        </p:txBody>
+      </p:sp>
+    </p:spTree>
+    <p:extLst>
+      <p:ext uri="{BB962C8B-B14F-4D97-AF65-F5344CB8AC3E}">
+        <p14:creationId xmlns:p14="http://schemas.microsoft.com/office/powerpoint/2010/main" val="2537584675"/>
+      </p:ext>
+    </p:extLst>
+  </p:cSld>
+  <p:clrMapOvr>
+    <a:masterClrMapping/>
+  </p:clrMapOvr>
+</p:sld>
+</file>
+
+<file path=ppt/slides/slide3.xml><?xml version="1.0" encoding="utf-8"?>
+<p:sld xmlns:a="http://schemas.openxmlformats.org/drawingml/2006/main" xmlns:r="http://schemas.openxmlformats.org/officeDocument/2006/relationships" xmlns:p="http://schemas.openxmlformats.org/presentationml/2006/main">
+  <p:cSld>
+    <p:spTree>
+      <p:nvGrpSpPr>
+        <p:cNvPr id="1" name=""/>
+        <p:cNvGrpSpPr/>
+        <p:nvPr/>
+      </p:nvGrpSpPr>
+      <p:grpSpPr>
+        <a:xfrm>
+          <a:off x="0" y="0"/>
+          <a:ext cx="0" cy="0"/>
+          <a:chOff x="0" y="0"/>
+          <a:chExt cx="0" cy="0"/>
+        </a:xfrm>
+      </p:grpSpPr>
+      <p:pic>
+        <p:nvPicPr>
+          <p:cNvPr id="5" name="Picture 4" descr="A picture containing chart&#10;&#10;Description automatically generated">
+            <a:extLst>
+              <a:ext uri="{FF2B5EF4-FFF2-40B4-BE49-F238E27FC236}">
+                <a16:creationId xmlns:a16="http://schemas.microsoft.com/office/drawing/2014/main" id="{F77AB014-14E3-49F2-BC11-301AD9DF7D05}"/>
+              </a:ext>
+            </a:extLst>
+          </p:cNvPr>
+          <p:cNvPicPr>
+            <a:picLocks noChangeAspect="1"/>
+          </p:cNvPicPr>
+          <p:nvPr/>
+        </p:nvPicPr>
+        <p:blipFill>
+          <a:blip r:embed="rId2">
+            <a:extLst>
+              <a:ext uri="{28A0092B-C50C-407E-A947-70E740481C1C}">
+                <a14:useLocalDpi xmlns:a14="http://schemas.microsoft.com/office/drawing/2010/main" val="0"/>
+              </a:ext>
+            </a:extLst>
+          </a:blip>
+          <a:stretch>
+            <a:fillRect/>
+          </a:stretch>
+        </p:blipFill>
+        <p:spPr>
+          <a:xfrm>
+            <a:off x="381614" y="0"/>
+            <a:ext cx="6735467" cy="4491579"/>
+          </a:xfrm>
+          <a:prstGeom prst="rect">
+            <a:avLst/>
+          </a:prstGeom>
+        </p:spPr>
+      </p:pic>
+      <p:pic>
+        <p:nvPicPr>
+          <p:cNvPr id="7" name="Picture 6" descr="Chart&#10;&#10;Description automatically generated">
+            <a:extLst>
+              <a:ext uri="{FF2B5EF4-FFF2-40B4-BE49-F238E27FC236}">
+                <a16:creationId xmlns:a16="http://schemas.microsoft.com/office/drawing/2014/main" id="{FF180FBF-6EB3-4523-B7A6-91C433CC6AD2}"/>
+              </a:ext>
+            </a:extLst>
+          </p:cNvPr>
+          <p:cNvPicPr>
+            <a:picLocks noChangeAspect="1"/>
+          </p:cNvPicPr>
+          <p:nvPr/>
+        </p:nvPicPr>
+        <p:blipFill>
+          <a:blip r:embed="rId3">
+            <a:extLst>
+              <a:ext uri="{28A0092B-C50C-407E-A947-70E740481C1C}">
+                <a14:useLocalDpi xmlns:a14="http://schemas.microsoft.com/office/drawing/2010/main" val="0"/>
+              </a:ext>
+            </a:extLst>
+          </a:blip>
+          <a:stretch>
+            <a:fillRect/>
+          </a:stretch>
+        </p:blipFill>
+        <p:spPr>
+          <a:xfrm>
+            <a:off x="249841" y="4491579"/>
+            <a:ext cx="6867239" cy="4579452"/>
+          </a:xfrm>
+          <a:prstGeom prst="rect">
+            <a:avLst/>
+          </a:prstGeom>
+        </p:spPr>
+      </p:pic>
+      <p:sp>
+        <p:nvSpPr>
+          <p:cNvPr id="8" name="TextBox 7">
+            <a:extLst>
+              <a:ext uri="{FF2B5EF4-FFF2-40B4-BE49-F238E27FC236}">
+                <a16:creationId xmlns:a16="http://schemas.microsoft.com/office/drawing/2014/main" id="{0DF8DBBB-018A-4423-AC10-6138A38FA0F4}"/>
+              </a:ext>
+            </a:extLst>
+          </p:cNvPr>
+          <p:cNvSpPr txBox="1"/>
+          <p:nvPr/>
+        </p:nvSpPr>
+        <p:spPr>
+          <a:xfrm>
+            <a:off x="249841" y="72969"/>
+            <a:ext cx="402674" cy="523220"/>
+          </a:xfrm>
+          <a:prstGeom prst="rect">
+            <a:avLst/>
+          </a:prstGeom>
+          <a:noFill/>
+        </p:spPr>
+        <p:txBody>
+          <a:bodyPr wrap="none" rtlCol="0">
+            <a:spAutoFit/>
+          </a:bodyPr>
+          <a:lstStyle/>
+          <a:p>
+            <a:r>
+              <a:rPr lang="en-US" sz="2800" dirty="0"/>
+              <a:t>A</a:t>
+            </a:r>
+            <a:endParaRPr lang="nb-NO" sz="2800" dirty="0"/>
+          </a:p>
+        </p:txBody>
+      </p:sp>
+      <p:sp>
+        <p:nvSpPr>
+          <p:cNvPr id="9" name="TextBox 8">
+            <a:extLst>
+              <a:ext uri="{FF2B5EF4-FFF2-40B4-BE49-F238E27FC236}">
+                <a16:creationId xmlns:a16="http://schemas.microsoft.com/office/drawing/2014/main" id="{7E699A75-76EE-4591-BFB6-D837892B1856}"/>
+              </a:ext>
+            </a:extLst>
+          </p:cNvPr>
+          <p:cNvSpPr txBox="1"/>
+          <p:nvPr/>
+        </p:nvSpPr>
+        <p:spPr>
+          <a:xfrm>
+            <a:off x="249840" y="4390812"/>
+            <a:ext cx="386644" cy="523220"/>
+          </a:xfrm>
+          <a:prstGeom prst="rect">
+            <a:avLst/>
+          </a:prstGeom>
+          <a:noFill/>
+        </p:spPr>
+        <p:txBody>
+          <a:bodyPr wrap="none" rtlCol="0">
+            <a:spAutoFit/>
+          </a:bodyPr>
+          <a:lstStyle/>
+          <a:p>
+            <a:r>
+              <a:rPr lang="en-US" sz="2800" dirty="0"/>
+              <a:t>B</a:t>
+            </a:r>
+            <a:endParaRPr lang="nb-NO" sz="2800" dirty="0"/>
+          </a:p>
+        </p:txBody>
+      </p:sp>
+      <p:sp>
+        <p:nvSpPr>
+          <p:cNvPr id="2" name="TextBox 1">
+            <a:extLst>
+              <a:ext uri="{FF2B5EF4-FFF2-40B4-BE49-F238E27FC236}">
+                <a16:creationId xmlns:a16="http://schemas.microsoft.com/office/drawing/2014/main" id="{24777478-F0A9-4DE7-B478-8A34A8100024}"/>
+              </a:ext>
+            </a:extLst>
+          </p:cNvPr>
+          <p:cNvSpPr txBox="1"/>
+          <p:nvPr/>
+        </p:nvSpPr>
+        <p:spPr>
+          <a:xfrm>
+            <a:off x="5933049" y="1382624"/>
+            <a:ext cx="1184031" cy="553998"/>
+          </a:xfrm>
+          <a:prstGeom prst="rect">
+            <a:avLst/>
+          </a:prstGeom>
+          <a:solidFill>
+            <a:schemeClr val="bg1"/>
+          </a:solidFill>
+        </p:spPr>
+        <p:txBody>
+          <a:bodyPr wrap="square" rtlCol="0">
+            <a:spAutoFit/>
+          </a:bodyPr>
+          <a:lstStyle/>
+          <a:p>
+            <a:r>
+              <a:rPr lang="en-US" sz="1500" dirty="0">
+                <a:latin typeface="Helvetica" panose="020B0604020202020204" pitchFamily="34" charset="0"/>
+                <a:cs typeface="Helvetica" panose="020B0604020202020204" pitchFamily="34" charset="0"/>
+              </a:rPr>
+              <a:t>Influence function</a:t>
+            </a:r>
+            <a:endParaRPr lang="nb-NO" sz="1500" dirty="0">
+              <a:latin typeface="Helvetica" panose="020B0604020202020204" pitchFamily="34" charset="0"/>
+              <a:cs typeface="Helvetica" panose="020B0604020202020204" pitchFamily="34" charset="0"/>
+            </a:endParaRPr>
+          </a:p>
+        </p:txBody>
+      </p:sp>
+      <p:cxnSp>
+        <p:nvCxnSpPr>
+          <p:cNvPr id="4" name="Straight Arrow Connector 3">
+            <a:extLst>
+              <a:ext uri="{FF2B5EF4-FFF2-40B4-BE49-F238E27FC236}">
+                <a16:creationId xmlns:a16="http://schemas.microsoft.com/office/drawing/2014/main" id="{4498FA76-9CAD-454A-BCE4-CFFE06CBC816}"/>
+              </a:ext>
+            </a:extLst>
+          </p:cNvPr>
+          <p:cNvCxnSpPr/>
+          <p:nvPr/>
+        </p:nvCxnSpPr>
+        <p:spPr>
+          <a:xfrm>
+            <a:off x="1195754" y="3522582"/>
+            <a:ext cx="2649415" cy="0"/>
+          </a:xfrm>
+          <a:prstGeom prst="straightConnector1">
+            <a:avLst/>
+          </a:prstGeom>
+          <a:ln w="19050">
+            <a:solidFill>
+              <a:schemeClr val="bg2">
+                <a:lumMod val="50000"/>
+              </a:schemeClr>
+            </a:solidFill>
+            <a:headEnd type="triangle" w="lg" len="med"/>
+            <a:tailEnd type="triangle" w="lg" len="med"/>
+          </a:ln>
+        </p:spPr>
+        <p:style>
+          <a:lnRef idx="1">
+            <a:schemeClr val="dk1"/>
+          </a:lnRef>
+          <a:fillRef idx="0">
+            <a:schemeClr val="dk1"/>
+          </a:fillRef>
+          <a:effectRef idx="0">
+            <a:schemeClr val="dk1"/>
+          </a:effectRef>
+          <a:fontRef idx="minor">
+            <a:schemeClr val="tx1"/>
+          </a:fontRef>
+        </p:style>
+      </p:cxnSp>
+      <p:sp>
+        <p:nvSpPr>
+          <p:cNvPr id="6" name="TextBox 5">
+            <a:extLst>
+              <a:ext uri="{FF2B5EF4-FFF2-40B4-BE49-F238E27FC236}">
+                <a16:creationId xmlns:a16="http://schemas.microsoft.com/office/drawing/2014/main" id="{65F86584-546B-4685-AD79-558F0D8592E5}"/>
+              </a:ext>
+            </a:extLst>
+          </p:cNvPr>
+          <p:cNvSpPr txBox="1"/>
+          <p:nvPr/>
+        </p:nvSpPr>
+        <p:spPr>
+          <a:xfrm>
+            <a:off x="6307902" y="1888778"/>
+            <a:ext cx="928459" cy="292388"/>
+          </a:xfrm>
+          <a:prstGeom prst="rect">
+            <a:avLst/>
+          </a:prstGeom>
+          <a:solidFill>
+            <a:schemeClr val="bg1"/>
+          </a:solidFill>
+        </p:spPr>
+        <p:txBody>
+          <a:bodyPr wrap="none" rtlCol="0">
+            <a:spAutoFit/>
+          </a:bodyPr>
+          <a:lstStyle/>
+          <a:p>
+            <a:r>
+              <a:rPr lang="en-US" sz="1300" dirty="0">
+                <a:latin typeface="Helvetica" panose="020B0604020202020204" pitchFamily="34" charset="0"/>
+                <a:cs typeface="Helvetica" panose="020B0604020202020204" pitchFamily="34" charset="0"/>
+              </a:rPr>
+              <a:t>Threshold</a:t>
+            </a:r>
+            <a:endParaRPr lang="nb-NO" sz="1300" dirty="0">
+              <a:latin typeface="Helvetica" panose="020B0604020202020204" pitchFamily="34" charset="0"/>
+              <a:cs typeface="Helvetica" panose="020B0604020202020204" pitchFamily="34" charset="0"/>
+            </a:endParaRPr>
+          </a:p>
+        </p:txBody>
+      </p:sp>
+      <p:sp>
+        <p:nvSpPr>
+          <p:cNvPr id="10" name="TextBox 9">
+            <a:extLst>
+              <a:ext uri="{FF2B5EF4-FFF2-40B4-BE49-F238E27FC236}">
+                <a16:creationId xmlns:a16="http://schemas.microsoft.com/office/drawing/2014/main" id="{E6BB5004-7A11-4436-AD04-5AB8A5DD03A0}"/>
+              </a:ext>
+            </a:extLst>
+          </p:cNvPr>
+          <p:cNvSpPr txBox="1"/>
+          <p:nvPr/>
+        </p:nvSpPr>
+        <p:spPr>
+          <a:xfrm>
+            <a:off x="6342784" y="2144121"/>
+            <a:ext cx="649537" cy="292388"/>
+          </a:xfrm>
+          <a:prstGeom prst="rect">
+            <a:avLst/>
+          </a:prstGeom>
+          <a:solidFill>
+            <a:schemeClr val="bg1"/>
+          </a:solidFill>
+        </p:spPr>
+        <p:txBody>
+          <a:bodyPr wrap="none" rtlCol="0">
+            <a:spAutoFit/>
+          </a:bodyPr>
+          <a:lstStyle/>
+          <a:p>
+            <a:r>
+              <a:rPr lang="en-US" sz="1300" dirty="0">
+                <a:latin typeface="Helvetica" panose="020B0604020202020204" pitchFamily="34" charset="0"/>
+                <a:cs typeface="Helvetica" panose="020B0604020202020204" pitchFamily="34" charset="0"/>
+              </a:rPr>
+              <a:t>Linear</a:t>
+            </a:r>
+            <a:endParaRPr lang="nb-NO" sz="1300" dirty="0">
+              <a:latin typeface="Helvetica" panose="020B0604020202020204" pitchFamily="34" charset="0"/>
+              <a:cs typeface="Helvetica" panose="020B0604020202020204" pitchFamily="34" charset="0"/>
+            </a:endParaRPr>
+          </a:p>
+        </p:txBody>
+      </p:sp>
+      <p:sp>
+        <p:nvSpPr>
+          <p:cNvPr id="11" name="TextBox 10">
+            <a:extLst>
+              <a:ext uri="{FF2B5EF4-FFF2-40B4-BE49-F238E27FC236}">
+                <a16:creationId xmlns:a16="http://schemas.microsoft.com/office/drawing/2014/main" id="{221EEBE5-AF7A-4939-9867-CC91B28E138D}"/>
+              </a:ext>
+            </a:extLst>
+          </p:cNvPr>
+          <p:cNvSpPr txBox="1"/>
+          <p:nvPr/>
+        </p:nvSpPr>
+        <p:spPr>
+          <a:xfrm>
+            <a:off x="6342784" y="2408095"/>
+            <a:ext cx="889987" cy="292388"/>
+          </a:xfrm>
+          <a:prstGeom prst="rect">
+            <a:avLst/>
+          </a:prstGeom>
+          <a:solidFill>
+            <a:schemeClr val="bg1"/>
+          </a:solidFill>
+        </p:spPr>
+        <p:txBody>
+          <a:bodyPr wrap="none" rtlCol="0">
+            <a:spAutoFit/>
+          </a:bodyPr>
+          <a:lstStyle/>
+          <a:p>
+            <a:r>
+              <a:rPr lang="en-US" sz="1300" dirty="0">
+                <a:latin typeface="Helvetica" panose="020B0604020202020204" pitchFamily="34" charset="0"/>
+                <a:cs typeface="Helvetica" panose="020B0604020202020204" pitchFamily="34" charset="0"/>
+              </a:rPr>
+              <a:t>Gaussian</a:t>
+            </a:r>
+            <a:endParaRPr lang="nb-NO" sz="1300" dirty="0">
+              <a:latin typeface="Helvetica" panose="020B0604020202020204" pitchFamily="34" charset="0"/>
+              <a:cs typeface="Helvetica" panose="020B0604020202020204" pitchFamily="34" charset="0"/>
+            </a:endParaRPr>
+          </a:p>
+        </p:txBody>
+      </p:sp>
+      <p:sp>
+        <p:nvSpPr>
+          <p:cNvPr id="14" name="TextBox 13">
+            <a:extLst>
+              <a:ext uri="{FF2B5EF4-FFF2-40B4-BE49-F238E27FC236}">
+                <a16:creationId xmlns:a16="http://schemas.microsoft.com/office/drawing/2014/main" id="{ACCCB353-6138-4916-8A9A-0D5F393B861A}"/>
+              </a:ext>
+            </a:extLst>
+          </p:cNvPr>
+          <p:cNvSpPr txBox="1"/>
+          <p:nvPr/>
+        </p:nvSpPr>
+        <p:spPr>
+          <a:xfrm>
+            <a:off x="1666896" y="3220335"/>
+            <a:ext cx="1566454" cy="307777"/>
+          </a:xfrm>
+          <a:prstGeom prst="rect">
+            <a:avLst/>
+          </a:prstGeom>
+          <a:noFill/>
+        </p:spPr>
+        <p:txBody>
+          <a:bodyPr wrap="none" rtlCol="0">
+            <a:spAutoFit/>
+          </a:bodyPr>
+          <a:lstStyle/>
+          <a:p>
+            <a:r>
+              <a:rPr lang="en-US" sz="1400" dirty="0">
+                <a:solidFill>
+                  <a:schemeClr val="bg2">
+                    <a:lumMod val="50000"/>
+                  </a:schemeClr>
+                </a:solidFill>
+                <a:latin typeface="Helvetica" panose="020B0604020202020204" pitchFamily="34" charset="0"/>
+                <a:cs typeface="Helvetica" panose="020B0604020202020204" pitchFamily="34" charset="0"/>
+              </a:rPr>
+              <a:t>Zone of Influence</a:t>
+            </a:r>
+            <a:endParaRPr lang="nb-NO" sz="1400" dirty="0">
+              <a:solidFill>
+                <a:schemeClr val="bg2">
+                  <a:lumMod val="50000"/>
+                </a:schemeClr>
+              </a:solidFill>
+              <a:latin typeface="Helvetica" panose="020B0604020202020204" pitchFamily="34" charset="0"/>
+              <a:cs typeface="Helvetica" panose="020B0604020202020204" pitchFamily="34" charset="0"/>
+            </a:endParaRPr>
+          </a:p>
+        </p:txBody>
+      </p:sp>
+      <p:sp>
+        <p:nvSpPr>
+          <p:cNvPr id="12" name="TextBox 11">
+            <a:extLst>
+              <a:ext uri="{FF2B5EF4-FFF2-40B4-BE49-F238E27FC236}">
+                <a16:creationId xmlns:a16="http://schemas.microsoft.com/office/drawing/2014/main" id="{CBCDA931-68DE-4A2F-9BB6-F502BB5E6B46}"/>
+              </a:ext>
+            </a:extLst>
+          </p:cNvPr>
+          <p:cNvSpPr txBox="1"/>
+          <p:nvPr/>
+        </p:nvSpPr>
+        <p:spPr>
+          <a:xfrm>
+            <a:off x="2812429" y="4185829"/>
+            <a:ext cx="1406168" cy="323165"/>
+          </a:xfrm>
+          <a:prstGeom prst="rect">
+            <a:avLst/>
+          </a:prstGeom>
+          <a:solidFill>
+            <a:schemeClr val="bg1"/>
+          </a:solidFill>
+        </p:spPr>
+        <p:txBody>
+          <a:bodyPr wrap="square" rtlCol="0">
+            <a:spAutoFit/>
+          </a:bodyPr>
+          <a:lstStyle/>
+          <a:p>
+            <a:r>
+              <a:rPr lang="en-US" sz="1500" dirty="0">
+                <a:latin typeface="Helvetica" panose="020B0604020202020204" pitchFamily="34" charset="0"/>
+                <a:cs typeface="Helvetica" panose="020B0604020202020204" pitchFamily="34" charset="0"/>
+              </a:rPr>
+              <a:t>Distance (m)</a:t>
+            </a:r>
+            <a:endParaRPr lang="nb-NO" sz="1500" dirty="0">
+              <a:latin typeface="Helvetica" panose="020B0604020202020204" pitchFamily="34" charset="0"/>
+              <a:cs typeface="Helvetica" panose="020B0604020202020204" pitchFamily="34" charset="0"/>
+            </a:endParaRPr>
+          </a:p>
+        </p:txBody>
+      </p:sp>
+      <p:sp>
+        <p:nvSpPr>
+          <p:cNvPr id="13" name="TextBox 12">
+            <a:extLst>
+              <a:ext uri="{FF2B5EF4-FFF2-40B4-BE49-F238E27FC236}">
+                <a16:creationId xmlns:a16="http://schemas.microsoft.com/office/drawing/2014/main" id="{997882AA-7A9E-45B7-B9E9-38CF31B40C51}"/>
+              </a:ext>
+            </a:extLst>
+          </p:cNvPr>
+          <p:cNvSpPr txBox="1"/>
+          <p:nvPr/>
+        </p:nvSpPr>
+        <p:spPr>
+          <a:xfrm rot="16200000">
+            <a:off x="-268214" y="1835817"/>
+            <a:ext cx="1406168" cy="323165"/>
+          </a:xfrm>
+          <a:prstGeom prst="rect">
+            <a:avLst/>
+          </a:prstGeom>
+          <a:solidFill>
+            <a:schemeClr val="bg1"/>
+          </a:solidFill>
+        </p:spPr>
+        <p:txBody>
+          <a:bodyPr wrap="square" rtlCol="0">
+            <a:spAutoFit/>
+          </a:bodyPr>
+          <a:lstStyle/>
+          <a:p>
+            <a:r>
+              <a:rPr lang="en-US" sz="1500" dirty="0">
+                <a:latin typeface="Helvetica" panose="020B0604020202020204" pitchFamily="34" charset="0"/>
+                <a:cs typeface="Helvetica" panose="020B0604020202020204" pitchFamily="34" charset="0"/>
+              </a:rPr>
+              <a:t>Influence</a:t>
+            </a:r>
+            <a:endParaRPr lang="nb-NO" sz="1500" dirty="0">
+              <a:latin typeface="Helvetica" panose="020B0604020202020204" pitchFamily="34" charset="0"/>
+              <a:cs typeface="Helvetica" panose="020B0604020202020204" pitchFamily="34" charset="0"/>
+            </a:endParaRPr>
+          </a:p>
+        </p:txBody>
+      </p:sp>
+      <p:sp>
+        <p:nvSpPr>
+          <p:cNvPr id="15" name="TextBox 14">
+            <a:extLst>
+              <a:ext uri="{FF2B5EF4-FFF2-40B4-BE49-F238E27FC236}">
+                <a16:creationId xmlns:a16="http://schemas.microsoft.com/office/drawing/2014/main" id="{9D4DC906-E8CB-42F8-A359-E6B799BE40DB}"/>
+              </a:ext>
+            </a:extLst>
+          </p:cNvPr>
+          <p:cNvSpPr txBox="1"/>
+          <p:nvPr/>
+        </p:nvSpPr>
+        <p:spPr>
+          <a:xfrm rot="16200000">
+            <a:off x="-339711" y="6442779"/>
+            <a:ext cx="1406168" cy="323165"/>
+          </a:xfrm>
+          <a:prstGeom prst="rect">
+            <a:avLst/>
+          </a:prstGeom>
+          <a:solidFill>
+            <a:schemeClr val="bg1"/>
+          </a:solidFill>
+        </p:spPr>
+        <p:txBody>
+          <a:bodyPr wrap="square" rtlCol="0">
+            <a:spAutoFit/>
+          </a:bodyPr>
+          <a:lstStyle/>
+          <a:p>
+            <a:r>
+              <a:rPr lang="en-US" sz="1500" dirty="0">
+                <a:latin typeface="Helvetica" panose="020B0604020202020204" pitchFamily="34" charset="0"/>
+                <a:cs typeface="Helvetica" panose="020B0604020202020204" pitchFamily="34" charset="0"/>
+              </a:rPr>
+              <a:t>Influence</a:t>
+            </a:r>
+            <a:endParaRPr lang="nb-NO" sz="1500" dirty="0">
+              <a:latin typeface="Helvetica" panose="020B0604020202020204" pitchFamily="34" charset="0"/>
+              <a:cs typeface="Helvetica" panose="020B0604020202020204" pitchFamily="34" charset="0"/>
+            </a:endParaRPr>
+          </a:p>
+        </p:txBody>
+      </p:sp>
+      <p:sp>
+        <p:nvSpPr>
+          <p:cNvPr id="16" name="TextBox 15">
+            <a:extLst>
+              <a:ext uri="{FF2B5EF4-FFF2-40B4-BE49-F238E27FC236}">
+                <a16:creationId xmlns:a16="http://schemas.microsoft.com/office/drawing/2014/main" id="{B15F53B9-256C-467D-9F56-A933334B015A}"/>
+              </a:ext>
+            </a:extLst>
+          </p:cNvPr>
+          <p:cNvSpPr txBox="1"/>
+          <p:nvPr/>
+        </p:nvSpPr>
+        <p:spPr>
+          <a:xfrm>
+            <a:off x="2812429" y="8778644"/>
+            <a:ext cx="1406168" cy="323165"/>
+          </a:xfrm>
+          <a:prstGeom prst="rect">
+            <a:avLst/>
+          </a:prstGeom>
+          <a:solidFill>
+            <a:schemeClr val="bg1"/>
+          </a:solidFill>
+        </p:spPr>
+        <p:txBody>
+          <a:bodyPr wrap="square" rtlCol="0">
+            <a:spAutoFit/>
+          </a:bodyPr>
+          <a:lstStyle/>
+          <a:p>
+            <a:r>
+              <a:rPr lang="en-US" sz="1500" dirty="0">
+                <a:latin typeface="Helvetica" panose="020B0604020202020204" pitchFamily="34" charset="0"/>
+                <a:cs typeface="Helvetica" panose="020B0604020202020204" pitchFamily="34" charset="0"/>
+              </a:rPr>
+              <a:t>Distance (m)</a:t>
+            </a:r>
+            <a:endParaRPr lang="nb-NO" sz="1500" dirty="0">
+              <a:latin typeface="Helvetica" panose="020B0604020202020204" pitchFamily="34" charset="0"/>
+              <a:cs typeface="Helvetica" panose="020B0604020202020204" pitchFamily="34" charset="0"/>
+            </a:endParaRPr>
+          </a:p>
+        </p:txBody>
+      </p:sp>
+    </p:spTree>
+    <p:extLst>
+      <p:ext uri="{BB962C8B-B14F-4D97-AF65-F5344CB8AC3E}">
+        <p14:creationId xmlns:p14="http://schemas.microsoft.com/office/powerpoint/2010/main" val="2875313705"/>
+      </p:ext>
+    </p:extLst>
+  </p:cSld>
+  <p:clrMapOvr>
+    <a:masterClrMapping/>
+  </p:clrMapOvr>
+</p:sld>
+</file>
+
+<file path=ppt/slides/slide4.xml><?xml version="1.0" encoding="utf-8"?>
+<p:sld xmlns:a="http://schemas.openxmlformats.org/drawingml/2006/main" xmlns:r="http://schemas.openxmlformats.org/officeDocument/2006/relationships" xmlns:p="http://schemas.openxmlformats.org/presentationml/2006/main">
+  <p:cSld>
+    <p:spTree>
+      <p:nvGrpSpPr>
+        <p:cNvPr id="1" name=""/>
+        <p:cNvGrpSpPr/>
+        <p:nvPr/>
+      </p:nvGrpSpPr>
+      <p:grpSpPr>
+        <a:xfrm>
+          <a:off x="0" y="0"/>
+          <a:ext cx="0" cy="0"/>
+          <a:chOff x="0" y="0"/>
+          <a:chExt cx="0" cy="0"/>
+        </a:xfrm>
+      </p:grpSpPr>
+      <p:pic>
+        <p:nvPicPr>
+          <p:cNvPr id="5" name="Picture 4">
+            <a:extLst>
+              <a:ext uri="{FF2B5EF4-FFF2-40B4-BE49-F238E27FC236}">
+                <a16:creationId xmlns:a16="http://schemas.microsoft.com/office/drawing/2014/main" id="{F77AB014-14E3-49F2-BC11-301AD9DF7D05}"/>
+              </a:ext>
+            </a:extLst>
+          </p:cNvPr>
+          <p:cNvPicPr>
+            <a:picLocks noChangeAspect="1"/>
+          </p:cNvPicPr>
+          <p:nvPr/>
+        </p:nvPicPr>
+        <p:blipFill>
+          <a:blip r:embed="rId2">
+            <a:extLst>
+              <a:ext uri="{28A0092B-C50C-407E-A947-70E740481C1C}">
+                <a14:useLocalDpi xmlns:a14="http://schemas.microsoft.com/office/drawing/2010/main" val="0"/>
+              </a:ext>
+            </a:extLst>
+          </a:blip>
+          <a:srcRect/>
+          <a:stretch/>
+        </p:blipFill>
+        <p:spPr>
+          <a:xfrm>
+            <a:off x="183954" y="144988"/>
+            <a:ext cx="6867239" cy="4579451"/>
+          </a:xfrm>
+          <a:prstGeom prst="rect">
+            <a:avLst/>
+          </a:prstGeom>
+        </p:spPr>
+      </p:pic>
+      <p:pic>
+        <p:nvPicPr>
+          <p:cNvPr id="7" name="Picture 6" descr="Chart&#10;&#10;Description automatically generated">
+            <a:extLst>
+              <a:ext uri="{FF2B5EF4-FFF2-40B4-BE49-F238E27FC236}">
+                <a16:creationId xmlns:a16="http://schemas.microsoft.com/office/drawing/2014/main" id="{FF180FBF-6EB3-4523-B7A6-91C433CC6AD2}"/>
+              </a:ext>
+            </a:extLst>
+          </p:cNvPr>
+          <p:cNvPicPr>
+            <a:picLocks noChangeAspect="1"/>
+          </p:cNvPicPr>
+          <p:nvPr/>
+        </p:nvPicPr>
+        <p:blipFill>
+          <a:blip r:embed="rId3">
+            <a:extLst>
+              <a:ext uri="{28A0092B-C50C-407E-A947-70E740481C1C}">
+                <a14:useLocalDpi xmlns:a14="http://schemas.microsoft.com/office/drawing/2010/main" val="0"/>
+              </a:ext>
+            </a:extLst>
+          </a:blip>
+          <a:stretch>
+            <a:fillRect/>
+          </a:stretch>
+        </p:blipFill>
+        <p:spPr>
+          <a:xfrm>
+            <a:off x="249841" y="4491579"/>
+            <a:ext cx="6867239" cy="4579452"/>
+          </a:xfrm>
+          <a:prstGeom prst="rect">
+            <a:avLst/>
+          </a:prstGeom>
+        </p:spPr>
+      </p:pic>
+      <p:sp>
+        <p:nvSpPr>
+          <p:cNvPr id="8" name="TextBox 7">
+            <a:extLst>
+              <a:ext uri="{FF2B5EF4-FFF2-40B4-BE49-F238E27FC236}">
+                <a16:creationId xmlns:a16="http://schemas.microsoft.com/office/drawing/2014/main" id="{0DF8DBBB-018A-4423-AC10-6138A38FA0F4}"/>
+              </a:ext>
+            </a:extLst>
+          </p:cNvPr>
+          <p:cNvSpPr txBox="1"/>
+          <p:nvPr/>
+        </p:nvSpPr>
+        <p:spPr>
+          <a:xfrm>
+            <a:off x="249841" y="72969"/>
+            <a:ext cx="402674" cy="523220"/>
+          </a:xfrm>
+          <a:prstGeom prst="rect">
+            <a:avLst/>
+          </a:prstGeom>
+          <a:noFill/>
+        </p:spPr>
+        <p:txBody>
+          <a:bodyPr wrap="none" rtlCol="0">
+            <a:spAutoFit/>
+          </a:bodyPr>
+          <a:lstStyle/>
+          <a:p>
+            <a:r>
+              <a:rPr lang="en-US" sz="2800" dirty="0"/>
+              <a:t>A</a:t>
+            </a:r>
+            <a:endParaRPr lang="nb-NO" sz="2800" dirty="0"/>
+          </a:p>
+        </p:txBody>
+      </p:sp>
+      <p:sp>
+        <p:nvSpPr>
+          <p:cNvPr id="9" name="TextBox 8">
+            <a:extLst>
+              <a:ext uri="{FF2B5EF4-FFF2-40B4-BE49-F238E27FC236}">
+                <a16:creationId xmlns:a16="http://schemas.microsoft.com/office/drawing/2014/main" id="{7E699A75-76EE-4591-BFB6-D837892B1856}"/>
+              </a:ext>
+            </a:extLst>
+          </p:cNvPr>
+          <p:cNvSpPr txBox="1"/>
+          <p:nvPr/>
+        </p:nvSpPr>
+        <p:spPr>
+          <a:xfrm>
+            <a:off x="249840" y="4390812"/>
+            <a:ext cx="386644" cy="523220"/>
+          </a:xfrm>
+          <a:prstGeom prst="rect">
+            <a:avLst/>
+          </a:prstGeom>
+          <a:noFill/>
+        </p:spPr>
+        <p:txBody>
+          <a:bodyPr wrap="none" rtlCol="0">
+            <a:spAutoFit/>
+          </a:bodyPr>
+          <a:lstStyle/>
+          <a:p>
+            <a:r>
+              <a:rPr lang="en-US" sz="2800" dirty="0"/>
+              <a:t>B</a:t>
+            </a:r>
+            <a:endParaRPr lang="nb-NO" sz="2800" dirty="0"/>
+          </a:p>
+        </p:txBody>
+      </p:sp>
+      <p:sp>
+        <p:nvSpPr>
+          <p:cNvPr id="15" name="TextBox 14">
+            <a:extLst>
+              <a:ext uri="{FF2B5EF4-FFF2-40B4-BE49-F238E27FC236}">
+                <a16:creationId xmlns:a16="http://schemas.microsoft.com/office/drawing/2014/main" id="{9D4DC906-E8CB-42F8-A359-E6B799BE40DB}"/>
+              </a:ext>
+            </a:extLst>
+          </p:cNvPr>
+          <p:cNvSpPr txBox="1"/>
+          <p:nvPr/>
+        </p:nvSpPr>
+        <p:spPr>
+          <a:xfrm rot="16200000">
+            <a:off x="-339711" y="6442779"/>
+            <a:ext cx="1406168" cy="323165"/>
+          </a:xfrm>
+          <a:prstGeom prst="rect">
+            <a:avLst/>
+          </a:prstGeom>
+          <a:solidFill>
+            <a:schemeClr val="bg1"/>
+          </a:solidFill>
+        </p:spPr>
+        <p:txBody>
+          <a:bodyPr wrap="square" rtlCol="0">
+            <a:spAutoFit/>
+          </a:bodyPr>
+          <a:lstStyle/>
+          <a:p>
+            <a:r>
+              <a:rPr lang="en-US" sz="1500" dirty="0">
+                <a:latin typeface="Helvetica" panose="020B0604020202020204" pitchFamily="34" charset="0"/>
+                <a:cs typeface="Helvetica" panose="020B0604020202020204" pitchFamily="34" charset="0"/>
+              </a:rPr>
+              <a:t>Influence</a:t>
+            </a:r>
+            <a:endParaRPr lang="nb-NO" sz="1500" dirty="0">
+              <a:latin typeface="Helvetica" panose="020B0604020202020204" pitchFamily="34" charset="0"/>
+              <a:cs typeface="Helvetica" panose="020B0604020202020204" pitchFamily="34" charset="0"/>
+            </a:endParaRPr>
+          </a:p>
+        </p:txBody>
+      </p:sp>
+      <p:sp>
+        <p:nvSpPr>
+          <p:cNvPr id="16" name="TextBox 15">
+            <a:extLst>
+              <a:ext uri="{FF2B5EF4-FFF2-40B4-BE49-F238E27FC236}">
+                <a16:creationId xmlns:a16="http://schemas.microsoft.com/office/drawing/2014/main" id="{B15F53B9-256C-467D-9F56-A933334B015A}"/>
+              </a:ext>
+            </a:extLst>
+          </p:cNvPr>
+          <p:cNvSpPr txBox="1"/>
+          <p:nvPr/>
+        </p:nvSpPr>
+        <p:spPr>
+          <a:xfrm>
+            <a:off x="2834731" y="8778644"/>
+            <a:ext cx="1406168" cy="323165"/>
+          </a:xfrm>
+          <a:prstGeom prst="rect">
+            <a:avLst/>
+          </a:prstGeom>
+          <a:solidFill>
+            <a:schemeClr val="bg1"/>
+          </a:solidFill>
+        </p:spPr>
+        <p:txBody>
+          <a:bodyPr wrap="square" rtlCol="0">
+            <a:spAutoFit/>
+          </a:bodyPr>
+          <a:lstStyle/>
+          <a:p>
+            <a:r>
+              <a:rPr lang="en-US" sz="1500" dirty="0">
+                <a:latin typeface="Helvetica" panose="020B0604020202020204" pitchFamily="34" charset="0"/>
+                <a:cs typeface="Helvetica" panose="020B0604020202020204" pitchFamily="34" charset="0"/>
+              </a:rPr>
+              <a:t>Distance (m)</a:t>
+            </a:r>
+            <a:endParaRPr lang="nb-NO" sz="1500" dirty="0">
+              <a:latin typeface="Helvetica" panose="020B0604020202020204" pitchFamily="34" charset="0"/>
+              <a:cs typeface="Helvetica" panose="020B0604020202020204" pitchFamily="34" charset="0"/>
+            </a:endParaRPr>
+          </a:p>
+        </p:txBody>
+      </p:sp>
+    </p:spTree>
+    <p:extLst>
+      <p:ext uri="{BB962C8B-B14F-4D97-AF65-F5344CB8AC3E}">
+        <p14:creationId xmlns:p14="http://schemas.microsoft.com/office/powerpoint/2010/main" val="3524788128"/>
+      </p:ext>
+    </p:extLst>
+  </p:cSld>
+  <p:clrMapOvr>
+    <a:masterClrMapping/>
+  </p:clrMapOvr>
+</p:sld>
+</file>
+
 <file path=ppt/theme/theme1.xml><?xml version="1.0" encoding="utf-8"?>
 <a:theme xmlns:a="http://schemas.openxmlformats.org/drawingml/2006/main" name="Office Theme">
   <a:themeElements>

</xml_diff>